<commit_message>
update day4 with aligned seqs
</commit_message>
<xml_diff>
--- a/day4/clockor2/molecular clocks.pptx
+++ b/day4/clockor2/molecular clocks.pptx
@@ -207,7 +207,7 @@
           <a:p>
             <a:fld id="{41295AE2-43AC-144B-AE88-DCB376799F11}" type="datetimeFigureOut">
               <a:rPr lang="en-US" smtClean="0"/>
-              <a:t>2/8/24</a:t>
+              <a:t>2/16/24</a:t>
             </a:fld>
             <a:endParaRPr lang="en-US"/>
           </a:p>
@@ -2791,7 +2791,7 @@
           <a:p>
             <a:fld id="{AF624FB1-CB24-4B4C-BFD4-AD276D9A4059}" type="datetimeFigureOut">
               <a:rPr lang="en-GB" smtClean="0"/>
-              <a:t>08/02/2024</a:t>
+              <a:t>16/02/2024</a:t>
             </a:fld>
             <a:endParaRPr lang="en-GB"/>
           </a:p>
@@ -3490,8 +3490,8 @@
         </p:blipFill>
         <p:spPr>
           <a:xfrm>
-            <a:off x="2209800" y="4353556"/>
-            <a:ext cx="7772400" cy="1598204"/>
+            <a:off x="1452719" y="4037032"/>
+            <a:ext cx="9584558" cy="1970830"/>
           </a:xfrm>
           <a:prstGeom prst="rect">
             <a:avLst/>
@@ -5125,6 +5125,51 @@
           <a:chExt cx="0" cy="0"/>
         </a:xfrm>
       </p:grpSpPr>
+      <p:pic>
+        <p:nvPicPr>
+          <p:cNvPr id="1026" name="Picture 2" descr="Topologies of phylogenetic trees: (a) unrooted tree, (b) rooted tree. |  Download Scientific Diagram">
+            <a:extLst>
+              <a:ext uri="{FF2B5EF4-FFF2-40B4-BE49-F238E27FC236}">
+                <a16:creationId xmlns:a16="http://schemas.microsoft.com/office/drawing/2014/main" id="{A7BAB3C0-D40C-876A-D8DB-6C2244402D60}"/>
+              </a:ext>
+            </a:extLst>
+          </p:cNvPr>
+          <p:cNvPicPr>
+            <a:picLocks noChangeAspect="1" noChangeArrowheads="1"/>
+          </p:cNvPicPr>
+          <p:nvPr/>
+        </p:nvPicPr>
+        <p:blipFill rotWithShape="1">
+          <a:blip r:embed="rId2">
+            <a:extLst>
+              <a:ext uri="{28A0092B-C50C-407E-A947-70E740481C1C}">
+                <a14:useLocalDpi xmlns:a14="http://schemas.microsoft.com/office/drawing/2010/main" val="0"/>
+              </a:ext>
+            </a:extLst>
+          </a:blip>
+          <a:srcRect b="22979"/>
+          <a:stretch/>
+        </p:blipFill>
+        <p:spPr bwMode="auto">
+          <a:xfrm>
+            <a:off x="431394" y="3763901"/>
+            <a:ext cx="11069409" cy="2777513"/>
+          </a:xfrm>
+          <a:prstGeom prst="rect">
+            <a:avLst/>
+          </a:prstGeom>
+          <a:noFill/>
+          <a:extLst>
+            <a:ext uri="{909E8E84-426E-40DD-AFC4-6F175D3DCCD1}">
+              <a14:hiddenFill xmlns:a14="http://schemas.microsoft.com/office/drawing/2010/main">
+                <a:solidFill>
+                  <a:srgbClr val="FFFFFF"/>
+                </a:solidFill>
+              </a14:hiddenFill>
+            </a:ext>
+          </a:extLst>
+        </p:spPr>
+      </p:pic>
       <p:sp>
         <p:nvSpPr>
           <p:cNvPr id="2" name="Title 1">
@@ -5180,56 +5225,42 @@
           <a:lstStyle/>
           <a:p>
             <a:r>
-              <a:rPr lang="en-GB" dirty="0">
+              <a:rPr lang="en-GB">
                 <a:latin typeface="Helvetica" pitchFamily="2" charset="0"/>
               </a:rPr>
               <a:t>A</a:t>
             </a:r>
             <a:r>
-              <a:rPr lang="en-GB" dirty="0">
+              <a:rPr lang="en-GB">
                 <a:effectLst/>
                 <a:latin typeface="Helvetica" pitchFamily="2" charset="0"/>
               </a:rPr>
-              <a:t> </a:t>
-            </a:r>
-            <a:r>
-              <a:rPr lang="en-GB" dirty="0" err="1">
-                <a:effectLst/>
-                <a:latin typeface="Helvetica" pitchFamily="2" charset="0"/>
-              </a:rPr>
-              <a:t>newick</a:t>
-            </a:r>
-            <a:r>
-              <a:rPr lang="en-GB" dirty="0">
-                <a:effectLst/>
-                <a:latin typeface="Helvetica" pitchFamily="2" charset="0"/>
-              </a:rPr>
-              <a:t> tree</a:t>
-            </a:r>
-          </a:p>
-          <a:p>
-            <a:r>
-              <a:rPr lang="en-GB" dirty="0">
+              <a:t> newick tree</a:t>
+            </a:r>
+          </a:p>
+          <a:p>
+            <a:r>
+              <a:rPr lang="en-GB">
                 <a:effectLst/>
                 <a:latin typeface="Helvetica" pitchFamily="2" charset="0"/>
               </a:rPr>
               <a:t>Sampling dates &amp; group identifiers (parsed from tip labels or separate files on input</a:t>
             </a:r>
             <a:r>
-              <a:rPr lang="en-GB" dirty="0">
+              <a:rPr lang="en-GB">
                 <a:latin typeface="Helvetica" pitchFamily="2" charset="0"/>
               </a:rPr>
               <a:t>)</a:t>
             </a:r>
           </a:p>
           <a:p>
-            <a:endParaRPr lang="en-GB" dirty="0">
+            <a:endParaRPr lang="en-GB">
               <a:effectLst/>
               <a:latin typeface="Helvetica" pitchFamily="2" charset="0"/>
             </a:endParaRPr>
           </a:p>
           <a:p>
-            <a:endParaRPr lang="en-GB" dirty="0">
+            <a:endParaRPr lang="en-GB">
               <a:effectLst/>
               <a:latin typeface="Helvetica" pitchFamily="2" charset="0"/>
             </a:endParaRPr>

</xml_diff>